<commit_message>
Correct grammar when list only has 1 or lesson person
</commit_message>
<xml_diff>
--- a/doc/Diagrams.pptx
+++ b/doc/Diagrams.pptx
@@ -109,6 +109,22 @@
       </a:defRPr>
     </a:lvl9pPr>
   </p:defaultTextStyle>
+  <p:extLst>
+    <p:ext uri="{EFAFB233-063F-42B5-8137-9DF3F51BA10A}">
+      <p15:sldGuideLst xmlns:p15="http://schemas.microsoft.com/office/powerpoint/2012/main">
+        <p15:guide id="1" orient="horz" pos="2160">
+          <p15:clr>
+            <a:srgbClr val="A4A3A4"/>
+          </p15:clr>
+        </p15:guide>
+        <p15:guide id="2" pos="2880">
+          <p15:clr>
+            <a:srgbClr val="A4A3A4"/>
+          </p15:clr>
+        </p15:guide>
+      </p15:sldGuideLst>
+    </p:ext>
+  </p:extLst>
 </p:presentation>
 </file>
 
@@ -194,7 +210,7 @@
           <a:p>
             <a:fld id="{F5CC4B3F-88C1-4FFA-B1B6-F41C21DC6924}" type="datetimeFigureOut">
               <a:rPr lang="en-US" smtClean="0"/>
-              <a:t>9/27/2016</a:t>
+              <a:t>2/25/17</a:t>
             </a:fld>
             <a:endParaRPr lang="en-US"/>
           </a:p>
@@ -506,6 +522,57 @@
           <a:bodyPr/>
           <a:lstStyle/>
           <a:p>
+            <a:r>
+              <a:rPr lang="en-US" dirty="0" smtClean="0"/>
+              <a:t>Dotted line</a:t>
+            </a:r>
+            <a:r>
+              <a:rPr lang="en-US" baseline="0" dirty="0" smtClean="0"/>
+              <a:t> arrow: dependency</a:t>
+            </a:r>
+          </a:p>
+          <a:p>
+            <a:r>
+              <a:rPr lang="en-US" baseline="0" dirty="0" smtClean="0"/>
+              <a:t>Dashed line arrow: </a:t>
+            </a:r>
+            <a:r>
+              <a:rPr lang="en-US" baseline="0" dirty="0" err="1" smtClean="0"/>
+              <a:t>assoication</a:t>
+            </a:r>
+            <a:endParaRPr lang="en-US" baseline="0" dirty="0" smtClean="0"/>
+          </a:p>
+          <a:p>
+            <a:r>
+              <a:rPr lang="en-US" baseline="0" dirty="0" smtClean="0"/>
+              <a:t>Triangle arrow line: subclass(</a:t>
+            </a:r>
+            <a:r>
+              <a:rPr lang="en-US" baseline="0" dirty="0" err="1" smtClean="0"/>
+              <a:t>es</a:t>
+            </a:r>
+            <a:r>
+              <a:rPr lang="en-US" baseline="0" dirty="0" smtClean="0"/>
+              <a:t>) to a superclass</a:t>
+            </a:r>
+          </a:p>
+          <a:p>
+            <a:r>
+              <a:rPr lang="en-US" baseline="0" dirty="0" smtClean="0"/>
+              <a:t>Empty diamond arrow: aggregation</a:t>
+            </a:r>
+          </a:p>
+          <a:p>
+            <a:r>
+              <a:rPr lang="en-US" baseline="0" dirty="0" smtClean="0"/>
+              <a:t>Solid diamond arrow</a:t>
+            </a:r>
+            <a:r>
+              <a:rPr lang="en-US" baseline="0" smtClean="0"/>
+              <a:t>: composition</a:t>
+            </a:r>
+          </a:p>
+          <a:p>
             <a:endParaRPr lang="en-US" dirty="0"/>
           </a:p>
         </p:txBody>
@@ -727,7 +794,7 @@
           <a:p>
             <a:fld id="{78C97017-6FC3-485B-9764-EAC9E56C1D49}" type="datetimeFigureOut">
               <a:rPr lang="en-US" smtClean="0"/>
-              <a:t>9/27/2016</a:t>
+              <a:t>2/25/17</a:t>
             </a:fld>
             <a:endParaRPr lang="en-US"/>
           </a:p>
@@ -897,7 +964,7 @@
           <a:p>
             <a:fld id="{78C97017-6FC3-485B-9764-EAC9E56C1D49}" type="datetimeFigureOut">
               <a:rPr lang="en-US" smtClean="0"/>
-              <a:t>9/27/2016</a:t>
+              <a:t>2/25/17</a:t>
             </a:fld>
             <a:endParaRPr lang="en-US"/>
           </a:p>
@@ -1077,7 +1144,7 @@
           <a:p>
             <a:fld id="{78C97017-6FC3-485B-9764-EAC9E56C1D49}" type="datetimeFigureOut">
               <a:rPr lang="en-US" smtClean="0"/>
-              <a:t>9/27/2016</a:t>
+              <a:t>2/25/17</a:t>
             </a:fld>
             <a:endParaRPr lang="en-US"/>
           </a:p>
@@ -1247,7 +1314,7 @@
           <a:p>
             <a:fld id="{78C97017-6FC3-485B-9764-EAC9E56C1D49}" type="datetimeFigureOut">
               <a:rPr lang="en-US" smtClean="0"/>
-              <a:t>9/27/2016</a:t>
+              <a:t>2/25/17</a:t>
             </a:fld>
             <a:endParaRPr lang="en-US"/>
           </a:p>
@@ -1493,7 +1560,7 @@
           <a:p>
             <a:fld id="{78C97017-6FC3-485B-9764-EAC9E56C1D49}" type="datetimeFigureOut">
               <a:rPr lang="en-US" smtClean="0"/>
-              <a:t>9/27/2016</a:t>
+              <a:t>2/25/17</a:t>
             </a:fld>
             <a:endParaRPr lang="en-US"/>
           </a:p>
@@ -1781,7 +1848,7 @@
           <a:p>
             <a:fld id="{78C97017-6FC3-485B-9764-EAC9E56C1D49}" type="datetimeFigureOut">
               <a:rPr lang="en-US" smtClean="0"/>
-              <a:t>9/27/2016</a:t>
+              <a:t>2/25/17</a:t>
             </a:fld>
             <a:endParaRPr lang="en-US"/>
           </a:p>
@@ -2203,7 +2270,7 @@
           <a:p>
             <a:fld id="{78C97017-6FC3-485B-9764-EAC9E56C1D49}" type="datetimeFigureOut">
               <a:rPr lang="en-US" smtClean="0"/>
-              <a:t>9/27/2016</a:t>
+              <a:t>2/25/17</a:t>
             </a:fld>
             <a:endParaRPr lang="en-US"/>
           </a:p>
@@ -2321,7 +2388,7 @@
           <a:p>
             <a:fld id="{78C97017-6FC3-485B-9764-EAC9E56C1D49}" type="datetimeFigureOut">
               <a:rPr lang="en-US" smtClean="0"/>
-              <a:t>9/27/2016</a:t>
+              <a:t>2/25/17</a:t>
             </a:fld>
             <a:endParaRPr lang="en-US"/>
           </a:p>
@@ -2416,7 +2483,7 @@
           <a:p>
             <a:fld id="{78C97017-6FC3-485B-9764-EAC9E56C1D49}" type="datetimeFigureOut">
               <a:rPr lang="en-US" smtClean="0"/>
-              <a:t>9/27/2016</a:t>
+              <a:t>2/25/17</a:t>
             </a:fld>
             <a:endParaRPr lang="en-US"/>
           </a:p>
@@ -2693,7 +2760,7 @@
           <a:p>
             <a:fld id="{78C97017-6FC3-485B-9764-EAC9E56C1D49}" type="datetimeFigureOut">
               <a:rPr lang="en-US" smtClean="0"/>
-              <a:t>9/27/2016</a:t>
+              <a:t>2/25/17</a:t>
             </a:fld>
             <a:endParaRPr lang="en-US"/>
           </a:p>
@@ -2946,7 +3013,7 @@
           <a:p>
             <a:fld id="{78C97017-6FC3-485B-9764-EAC9E56C1D49}" type="datetimeFigureOut">
               <a:rPr lang="en-US" smtClean="0"/>
-              <a:t>9/27/2016</a:t>
+              <a:t>2/25/17</a:t>
             </a:fld>
             <a:endParaRPr lang="en-US"/>
           </a:p>
@@ -3159,7 +3226,7 @@
           <a:p>
             <a:fld id="{78C97017-6FC3-485B-9764-EAC9E56C1D49}" type="datetimeFigureOut">
               <a:rPr lang="en-US" smtClean="0"/>
-              <a:t>9/27/2016</a:t>
+              <a:t>2/25/17</a:t>
             </a:fld>
             <a:endParaRPr lang="en-US"/>
           </a:p>

</xml_diff>